<commit_message>
RNN&LSTM Model System Explanation PowerPoint
</commit_message>
<xml_diff>
--- a/RNNLSTM_Detail.pptx
+++ b/RNNLSTM_Detail.pptx
@@ -3336,6 +3336,65 @@
       </p:grpSpPr>
       <p:sp>
         <p:nvSpPr>
+          <p:cNvPr id="15" name="직사각형 14">
+            <a:extLst>
+              <a:ext uri="{FF2B5EF4-FFF2-40B4-BE49-F238E27FC236}">
+                <a16:creationId xmlns:a16="http://schemas.microsoft.com/office/drawing/2014/main" id="{41F46227-DDBA-43D2-A0B4-D3EA70CA0AA4}"/>
+              </a:ext>
+            </a:extLst>
+          </p:cNvPr>
+          <p:cNvSpPr/>
+          <p:nvPr/>
+        </p:nvSpPr>
+        <p:spPr>
+          <a:xfrm>
+            <a:off x="6095999" y="4177213"/>
+            <a:ext cx="4202545" cy="861916"/>
+          </a:xfrm>
+          <a:prstGeom prst="rect">
+            <a:avLst/>
+          </a:prstGeom>
+          <a:noFill/>
+          <a:ln w="28575">
+            <a:solidFill>
+              <a:schemeClr val="tx1"/>
+            </a:solidFill>
+          </a:ln>
+          <a:effectLst>
+            <a:outerShdw blurRad="50800" dist="38100" algn="l" rotWithShape="0">
+              <a:prstClr val="black">
+                <a:alpha val="40000"/>
+              </a:prstClr>
+            </a:outerShdw>
+          </a:effectLst>
+        </p:spPr>
+        <p:style>
+          <a:lnRef idx="2">
+            <a:schemeClr val="accent1">
+              <a:shade val="50000"/>
+            </a:schemeClr>
+          </a:lnRef>
+          <a:fillRef idx="1">
+            <a:schemeClr val="accent1"/>
+          </a:fillRef>
+          <a:effectRef idx="0">
+            <a:schemeClr val="accent1"/>
+          </a:effectRef>
+          <a:fontRef idx="minor">
+            <a:schemeClr val="lt1"/>
+          </a:fontRef>
+        </p:style>
+        <p:txBody>
+          <a:bodyPr rtlCol="0" anchor="ctr"/>
+          <a:lstStyle/>
+          <a:p>
+            <a:pPr algn="ctr"/>
+            <a:endParaRPr lang="ko-KR" altLang="en-US"/>
+          </a:p>
+        </p:txBody>
+      </p:sp>
+      <p:sp>
+        <p:nvSpPr>
           <p:cNvPr id="13" name="직사각형 12">
             <a:extLst>
               <a:ext uri="{FF2B5EF4-FFF2-40B4-BE49-F238E27FC236}">
@@ -3579,7 +3638,7 @@
         </p:nvSpPr>
         <p:spPr>
           <a:xfrm>
-            <a:off x="5384800" y="3803385"/>
+            <a:off x="5828684" y="3801919"/>
             <a:ext cx="4913745" cy="784830"/>
           </a:xfrm>
           <a:prstGeom prst="rect">
@@ -3658,7 +3717,7 @@
         </p:nvSpPr>
         <p:spPr>
           <a:xfrm>
-            <a:off x="6096000" y="3384454"/>
+            <a:off x="7305964" y="3411165"/>
             <a:ext cx="4202545" cy="369332"/>
           </a:xfrm>
           <a:prstGeom prst="rect">
@@ -3784,6 +3843,73 @@
           </a:p>
         </p:txBody>
       </p:sp>
+      <p:sp>
+        <p:nvSpPr>
+          <p:cNvPr id="16" name="TextBox 15">
+            <a:extLst>
+              <a:ext uri="{FF2B5EF4-FFF2-40B4-BE49-F238E27FC236}">
+                <a16:creationId xmlns:a16="http://schemas.microsoft.com/office/drawing/2014/main" id="{9145FDAC-853C-4EB2-8A0C-34338A300BC4}"/>
+              </a:ext>
+            </a:extLst>
+          </p:cNvPr>
+          <p:cNvSpPr txBox="1"/>
+          <p:nvPr/>
+        </p:nvSpPr>
+        <p:spPr>
+          <a:xfrm>
+            <a:off x="6363314" y="4669797"/>
+            <a:ext cx="4202545" cy="369332"/>
+          </a:xfrm>
+          <a:prstGeom prst="rect">
+            <a:avLst/>
+          </a:prstGeom>
+          <a:noFill/>
+        </p:spPr>
+        <p:txBody>
+          <a:bodyPr wrap="square" rtlCol="0">
+            <a:spAutoFit/>
+          </a:bodyPr>
+          <a:lstStyle/>
+          <a:p>
+            <a:pPr algn="ctr"/>
+            <a:r>
+              <a:rPr lang="en-US" altLang="ko-KR" b="1" dirty="0">
+                <a:ln w="0">
+                  <a:solidFill>
+                    <a:schemeClr val="bg1"/>
+                  </a:solidFill>
+                </a:ln>
+                <a:effectLst>
+                  <a:outerShdw blurRad="50800" dist="38100" dir="2700000" algn="tl" rotWithShape="0">
+                    <a:prstClr val="black">
+                      <a:alpha val="40000"/>
+                    </a:prstClr>
+                  </a:outerShdw>
+                </a:effectLst>
+                <a:latin typeface="레시피코리아 Medium" panose="02020603020101020101" pitchFamily="18" charset="-127"/>
+                <a:ea typeface="레시피코리아 Medium" panose="02020603020101020101" pitchFamily="18" charset="-127"/>
+              </a:rPr>
+              <a:t>http://github.com/Ian0720</a:t>
+            </a:r>
+            <a:endParaRPr lang="ko-KR" altLang="en-US" b="1" dirty="0">
+              <a:ln w="0">
+                <a:solidFill>
+                  <a:schemeClr val="bg1"/>
+                </a:solidFill>
+              </a:ln>
+              <a:effectLst>
+                <a:outerShdw blurRad="50800" dist="38100" dir="2700000" algn="tl" rotWithShape="0">
+                  <a:prstClr val="black">
+                    <a:alpha val="40000"/>
+                  </a:prstClr>
+                </a:outerShdw>
+              </a:effectLst>
+              <a:latin typeface="레시피코리아 Medium" panose="02020603020101020101" pitchFamily="18" charset="-127"/>
+              <a:ea typeface="레시피코리아 Medium" panose="02020603020101020101" pitchFamily="18" charset="-127"/>
+            </a:endParaRPr>
+          </a:p>
+        </p:txBody>
+      </p:sp>
     </p:spTree>
     <p:extLst>
       <p:ext uri="{BB962C8B-B14F-4D97-AF65-F5344CB8AC3E}">
@@ -4341,7 +4467,21 @@
                 <a:latin typeface="레시피코리아 Medium" panose="02020603020101020101" pitchFamily="18" charset="-127"/>
                 <a:ea typeface="레시피코리아 Medium" panose="02020603020101020101" pitchFamily="18" charset="-127"/>
               </a:rPr>
-              <a:t>Project Name : ‘Author Bot  =  </a:t>
+              <a:t>Project Name : ‘Author(</a:t>
+            </a:r>
+            <a:r>
+              <a:rPr lang="ko-KR" altLang="en-US" sz="2400" dirty="0">
+                <a:latin typeface="레시피코리아 Medium" panose="02020603020101020101" pitchFamily="18" charset="-127"/>
+                <a:ea typeface="레시피코리아 Medium" panose="02020603020101020101" pitchFamily="18" charset="-127"/>
+              </a:rPr>
+              <a:t>작가</a:t>
+            </a:r>
+            <a:r>
+              <a:rPr lang="en-US" altLang="ko-KR" sz="2400" dirty="0">
+                <a:latin typeface="레시피코리아 Medium" panose="02020603020101020101" pitchFamily="18" charset="-127"/>
+                <a:ea typeface="레시피코리아 Medium" panose="02020603020101020101" pitchFamily="18" charset="-127"/>
+              </a:rPr>
+              <a:t>) Bot  =  </a:t>
             </a:r>
             <a:r>
               <a:rPr lang="en-US" altLang="ko-KR" sz="2400" dirty="0" err="1">
@@ -4355,7 +4495,21 @@
                 <a:latin typeface="레시피코리아 Medium" panose="02020603020101020101" pitchFamily="18" charset="-127"/>
                 <a:ea typeface="레시피코리아 Medium" panose="02020603020101020101" pitchFamily="18" charset="-127"/>
               </a:rPr>
-              <a:t>’</a:t>
+              <a:t>(</a:t>
+            </a:r>
+            <a:r>
+              <a:rPr lang="ko-KR" altLang="en-US" sz="2400" dirty="0" err="1">
+                <a:latin typeface="레시피코리아 Medium" panose="02020603020101020101" pitchFamily="18" charset="-127"/>
+                <a:ea typeface="레시피코리아 Medium" panose="02020603020101020101" pitchFamily="18" charset="-127"/>
+              </a:rPr>
+              <a:t>오토봇</a:t>
+            </a:r>
+            <a:r>
+              <a:rPr lang="en-US" altLang="ko-KR" sz="2400" dirty="0">
+                <a:latin typeface="레시피코리아 Medium" panose="02020603020101020101" pitchFamily="18" charset="-127"/>
+                <a:ea typeface="레시피코리아 Medium" panose="02020603020101020101" pitchFamily="18" charset="-127"/>
+              </a:rPr>
+              <a:t>)’</a:t>
             </a:r>
           </a:p>
           <a:p>

</xml_diff>